<commit_message>
Update ANL201 Study Unit 1_2022 - Lecturer.pptx
</commit_message>
<xml_diff>
--- a/SuSS/2022_ANL201_Viz_Biz/3_Lecture/ANL201 Study Unit 1_2022 - Lecturer.pptx
+++ b/SuSS/2022_ANL201_Viz_Biz/3_Lecture/ANL201 Study Unit 1_2022 - Lecturer.pptx
@@ -4300,7 +4300,7 @@
           <a:p>
             <a:fld id="{FB7F86EF-755F-EF49-95CD-E6F9DEA0E285}" type="datetimeFigureOut">
               <a:rPr lang="en-US" smtClean="0"/>
-              <a:t>1/20/2022</a:t>
+              <a:t>2/4/2022</a:t>
             </a:fld>
             <a:endParaRPr lang="en-US"/>
           </a:p>
@@ -4465,7 +4465,7 @@
           <a:p>
             <a:fld id="{847550CD-65C1-0D40-9457-6DF5C95A232D}" type="datetimeFigureOut">
               <a:rPr lang="en-US" smtClean="0"/>
-              <a:t>1/20/2022</a:t>
+              <a:t>2/4/2022</a:t>
             </a:fld>
             <a:endParaRPr lang="en-US"/>
           </a:p>
@@ -24868,7 +24868,7 @@
           <a:p>
             <a:r>
               <a:rPr lang="en-US" dirty="0"/>
-              <a:t>Counter cyclic investment</a:t>
+              <a:t>Counter Cyclic Investment Strategy</a:t>
             </a:r>
             <a:endParaRPr lang="en-SG" dirty="0"/>
           </a:p>
@@ -24950,12 +24950,42 @@
             <a:pPr lvl="1"/>
             <a:r>
               <a:rPr lang="en-US" dirty="0"/>
-              <a:t>If price/ demand fall, companies invest. They ramp up hiring, spend on R&amp;D, train their people – this means that at the next positive wave, the company is position to surge ahead of its competition</a:t>
+              <a:t>If price/ demand fall, companies invest. They ramp up hiring, spend on R&amp;D, train their people – this means that at the next positive wave, the company is positioned to surge ahead of its competition</a:t>
             </a:r>
             <a:endParaRPr lang="en-SG" dirty="0"/>
           </a:p>
         </p:txBody>
       </p:sp>
+      <p:pic>
+        <p:nvPicPr>
+          <p:cNvPr id="5" name="Picture 4">
+            <a:extLst>
+              <a:ext uri="{FF2B5EF4-FFF2-40B4-BE49-F238E27FC236}">
+                <a16:creationId xmlns:a16="http://schemas.microsoft.com/office/drawing/2014/main" id="{D4992C7E-7224-4359-AACC-A46B44BBC868}"/>
+              </a:ext>
+            </a:extLst>
+          </p:cNvPr>
+          <p:cNvPicPr>
+            <a:picLocks noChangeAspect="1"/>
+          </p:cNvPicPr>
+          <p:nvPr/>
+        </p:nvPicPr>
+        <p:blipFill>
+          <a:blip r:embed="rId2"/>
+          <a:stretch>
+            <a:fillRect/>
+          </a:stretch>
+        </p:blipFill>
+        <p:spPr>
+          <a:xfrm>
+            <a:off x="5399251" y="38846"/>
+            <a:ext cx="3484536" cy="1742268"/>
+          </a:xfrm>
+          <a:prstGeom prst="rect">
+            <a:avLst/>
+          </a:prstGeom>
+        </p:spPr>
+      </p:pic>
     </p:spTree>
     <p:extLst>
       <p:ext uri="{BB962C8B-B14F-4D97-AF65-F5344CB8AC3E}">
@@ -24966,6 +24996,334 @@
   <p:clrMapOvr>
     <a:masterClrMapping/>
   </p:clrMapOvr>
+  <p:timing>
+    <p:tnLst>
+      <p:par>
+        <p:cTn id="1" dur="indefinite" restart="never" nodeType="tmRoot">
+          <p:childTnLst>
+            <p:seq concurrent="1" nextAc="seek">
+              <p:cTn id="2" dur="indefinite" nodeType="mainSeq">
+                <p:childTnLst>
+                  <p:par>
+                    <p:cTn id="3" fill="hold">
+                      <p:stCondLst>
+                        <p:cond delay="indefinite"/>
+                      </p:stCondLst>
+                      <p:childTnLst>
+                        <p:par>
+                          <p:cTn id="4" fill="hold">
+                            <p:stCondLst>
+                              <p:cond delay="0"/>
+                            </p:stCondLst>
+                            <p:childTnLst>
+                              <p:par>
+                                <p:cTn id="5" presetID="1" presetClass="entr" presetSubtype="0" fill="hold" nodeType="clickEffect">
+                                  <p:stCondLst>
+                                    <p:cond delay="0"/>
+                                  </p:stCondLst>
+                                  <p:childTnLst>
+                                    <p:set>
+                                      <p:cBhvr>
+                                        <p:cTn id="6" dur="1" fill="hold">
+                                          <p:stCondLst>
+                                            <p:cond delay="0"/>
+                                          </p:stCondLst>
+                                        </p:cTn>
+                                        <p:tgtEl>
+                                          <p:spTgt spid="4">
+                                            <p:txEl>
+                                              <p:pRg st="0" end="0"/>
+                                            </p:txEl>
+                                          </p:spTgt>
+                                        </p:tgtEl>
+                                        <p:attrNameLst>
+                                          <p:attrName>style.visibility</p:attrName>
+                                        </p:attrNameLst>
+                                      </p:cBhvr>
+                                      <p:to>
+                                        <p:strVal val="visible"/>
+                                      </p:to>
+                                    </p:set>
+                                  </p:childTnLst>
+                                </p:cTn>
+                              </p:par>
+                              <p:par>
+                                <p:cTn id="7" presetID="1" presetClass="entr" presetSubtype="0" fill="hold" nodeType="withEffect">
+                                  <p:stCondLst>
+                                    <p:cond delay="0"/>
+                                  </p:stCondLst>
+                                  <p:childTnLst>
+                                    <p:set>
+                                      <p:cBhvr>
+                                        <p:cTn id="8" dur="1" fill="hold">
+                                          <p:stCondLst>
+                                            <p:cond delay="0"/>
+                                          </p:stCondLst>
+                                        </p:cTn>
+                                        <p:tgtEl>
+                                          <p:spTgt spid="4">
+                                            <p:txEl>
+                                              <p:pRg st="1" end="1"/>
+                                            </p:txEl>
+                                          </p:spTgt>
+                                        </p:tgtEl>
+                                        <p:attrNameLst>
+                                          <p:attrName>style.visibility</p:attrName>
+                                        </p:attrNameLst>
+                                      </p:cBhvr>
+                                      <p:to>
+                                        <p:strVal val="visible"/>
+                                      </p:to>
+                                    </p:set>
+                                  </p:childTnLst>
+                                </p:cTn>
+                              </p:par>
+                              <p:par>
+                                <p:cTn id="9" presetID="1" presetClass="entr" presetSubtype="0" fill="hold" nodeType="withEffect">
+                                  <p:stCondLst>
+                                    <p:cond delay="0"/>
+                                  </p:stCondLst>
+                                  <p:childTnLst>
+                                    <p:set>
+                                      <p:cBhvr>
+                                        <p:cTn id="10" dur="1" fill="hold">
+                                          <p:stCondLst>
+                                            <p:cond delay="0"/>
+                                          </p:stCondLst>
+                                        </p:cTn>
+                                        <p:tgtEl>
+                                          <p:spTgt spid="4">
+                                            <p:txEl>
+                                              <p:pRg st="2" end="2"/>
+                                            </p:txEl>
+                                          </p:spTgt>
+                                        </p:tgtEl>
+                                        <p:attrNameLst>
+                                          <p:attrName>style.visibility</p:attrName>
+                                        </p:attrNameLst>
+                                      </p:cBhvr>
+                                      <p:to>
+                                        <p:strVal val="visible"/>
+                                      </p:to>
+                                    </p:set>
+                                  </p:childTnLst>
+                                </p:cTn>
+                              </p:par>
+                              <p:par>
+                                <p:cTn id="11" presetID="1" presetClass="entr" presetSubtype="0" fill="hold" nodeType="withEffect">
+                                  <p:stCondLst>
+                                    <p:cond delay="0"/>
+                                  </p:stCondLst>
+                                  <p:childTnLst>
+                                    <p:set>
+                                      <p:cBhvr>
+                                        <p:cTn id="12" dur="1" fill="hold">
+                                          <p:stCondLst>
+                                            <p:cond delay="0"/>
+                                          </p:stCondLst>
+                                        </p:cTn>
+                                        <p:tgtEl>
+                                          <p:spTgt spid="4">
+                                            <p:txEl>
+                                              <p:pRg st="3" end="3"/>
+                                            </p:txEl>
+                                          </p:spTgt>
+                                        </p:tgtEl>
+                                        <p:attrNameLst>
+                                          <p:attrName>style.visibility</p:attrName>
+                                        </p:attrNameLst>
+                                      </p:cBhvr>
+                                      <p:to>
+                                        <p:strVal val="visible"/>
+                                      </p:to>
+                                    </p:set>
+                                  </p:childTnLst>
+                                </p:cTn>
+                              </p:par>
+                            </p:childTnLst>
+                          </p:cTn>
+                        </p:par>
+                      </p:childTnLst>
+                    </p:cTn>
+                  </p:par>
+                  <p:par>
+                    <p:cTn id="13" fill="hold">
+                      <p:stCondLst>
+                        <p:cond delay="indefinite"/>
+                      </p:stCondLst>
+                      <p:childTnLst>
+                        <p:par>
+                          <p:cTn id="14" fill="hold">
+                            <p:stCondLst>
+                              <p:cond delay="0"/>
+                            </p:stCondLst>
+                            <p:childTnLst>
+                              <p:par>
+                                <p:cTn id="15" presetID="1" presetClass="entr" presetSubtype="0" fill="hold" nodeType="clickEffect">
+                                  <p:stCondLst>
+                                    <p:cond delay="0"/>
+                                  </p:stCondLst>
+                                  <p:childTnLst>
+                                    <p:set>
+                                      <p:cBhvr>
+                                        <p:cTn id="16" dur="1" fill="hold">
+                                          <p:stCondLst>
+                                            <p:cond delay="0"/>
+                                          </p:stCondLst>
+                                        </p:cTn>
+                                        <p:tgtEl>
+                                          <p:spTgt spid="5"/>
+                                        </p:tgtEl>
+                                        <p:attrNameLst>
+                                          <p:attrName>style.visibility</p:attrName>
+                                        </p:attrNameLst>
+                                      </p:cBhvr>
+                                      <p:to>
+                                        <p:strVal val="visible"/>
+                                      </p:to>
+                                    </p:set>
+                                  </p:childTnLst>
+                                </p:cTn>
+                              </p:par>
+                            </p:childTnLst>
+                          </p:cTn>
+                        </p:par>
+                      </p:childTnLst>
+                    </p:cTn>
+                  </p:par>
+                  <p:par>
+                    <p:cTn id="17" fill="hold">
+                      <p:stCondLst>
+                        <p:cond delay="indefinite"/>
+                      </p:stCondLst>
+                      <p:childTnLst>
+                        <p:par>
+                          <p:cTn id="18" fill="hold">
+                            <p:stCondLst>
+                              <p:cond delay="0"/>
+                            </p:stCondLst>
+                            <p:childTnLst>
+                              <p:par>
+                                <p:cTn id="19" presetID="1" presetClass="entr" presetSubtype="0" fill="hold" nodeType="clickEffect">
+                                  <p:stCondLst>
+                                    <p:cond delay="0"/>
+                                  </p:stCondLst>
+                                  <p:childTnLst>
+                                    <p:set>
+                                      <p:cBhvr>
+                                        <p:cTn id="20" dur="1" fill="hold">
+                                          <p:stCondLst>
+                                            <p:cond delay="0"/>
+                                          </p:stCondLst>
+                                        </p:cTn>
+                                        <p:tgtEl>
+                                          <p:spTgt spid="4">
+                                            <p:txEl>
+                                              <p:pRg st="5" end="5"/>
+                                            </p:txEl>
+                                          </p:spTgt>
+                                        </p:tgtEl>
+                                        <p:attrNameLst>
+                                          <p:attrName>style.visibility</p:attrName>
+                                        </p:attrNameLst>
+                                      </p:cBhvr>
+                                      <p:to>
+                                        <p:strVal val="visible"/>
+                                      </p:to>
+                                    </p:set>
+                                  </p:childTnLst>
+                                </p:cTn>
+                              </p:par>
+                              <p:par>
+                                <p:cTn id="21" presetID="1" presetClass="entr" presetSubtype="0" fill="hold" nodeType="withEffect">
+                                  <p:stCondLst>
+                                    <p:cond delay="0"/>
+                                  </p:stCondLst>
+                                  <p:childTnLst>
+                                    <p:set>
+                                      <p:cBhvr>
+                                        <p:cTn id="22" dur="1" fill="hold">
+                                          <p:stCondLst>
+                                            <p:cond delay="0"/>
+                                          </p:stCondLst>
+                                        </p:cTn>
+                                        <p:tgtEl>
+                                          <p:spTgt spid="4">
+                                            <p:txEl>
+                                              <p:pRg st="6" end="6"/>
+                                            </p:txEl>
+                                          </p:spTgt>
+                                        </p:tgtEl>
+                                        <p:attrNameLst>
+                                          <p:attrName>style.visibility</p:attrName>
+                                        </p:attrNameLst>
+                                      </p:cBhvr>
+                                      <p:to>
+                                        <p:strVal val="visible"/>
+                                      </p:to>
+                                    </p:set>
+                                  </p:childTnLst>
+                                </p:cTn>
+                              </p:par>
+                              <p:par>
+                                <p:cTn id="23" presetID="1" presetClass="entr" presetSubtype="0" fill="hold" nodeType="withEffect">
+                                  <p:stCondLst>
+                                    <p:cond delay="0"/>
+                                  </p:stCondLst>
+                                  <p:childTnLst>
+                                    <p:set>
+                                      <p:cBhvr>
+                                        <p:cTn id="24" dur="1" fill="hold">
+                                          <p:stCondLst>
+                                            <p:cond delay="0"/>
+                                          </p:stCondLst>
+                                        </p:cTn>
+                                        <p:tgtEl>
+                                          <p:spTgt spid="4">
+                                            <p:txEl>
+                                              <p:pRg st="7" end="7"/>
+                                            </p:txEl>
+                                          </p:spTgt>
+                                        </p:tgtEl>
+                                        <p:attrNameLst>
+                                          <p:attrName>style.visibility</p:attrName>
+                                        </p:attrNameLst>
+                                      </p:cBhvr>
+                                      <p:to>
+                                        <p:strVal val="visible"/>
+                                      </p:to>
+                                    </p:set>
+                                  </p:childTnLst>
+                                </p:cTn>
+                              </p:par>
+                            </p:childTnLst>
+                          </p:cTn>
+                        </p:par>
+                      </p:childTnLst>
+                    </p:cTn>
+                  </p:par>
+                </p:childTnLst>
+              </p:cTn>
+              <p:prevCondLst>
+                <p:cond evt="onPrev" delay="0">
+                  <p:tgtEl>
+                    <p:sldTgt/>
+                  </p:tgtEl>
+                </p:cond>
+              </p:prevCondLst>
+              <p:nextCondLst>
+                <p:cond evt="onNext" delay="0">
+                  <p:tgtEl>
+                    <p:sldTgt/>
+                  </p:tgtEl>
+                </p:cond>
+              </p:nextCondLst>
+            </p:seq>
+          </p:childTnLst>
+        </p:cTn>
+      </p:par>
+    </p:tnLst>
+  </p:timing>
 </p:sld>
 </file>
 
@@ -39607,9 +39965,7 @@
                                           </p:stCondLst>
                                         </p:cTn>
                                         <p:tgtEl>
-                                          <p:spTgt spid="13">
-                                            <p:bg/>
-                                          </p:spTgt>
+                                          <p:spTgt spid="16"/>
                                         </p:tgtEl>
                                         <p:attrNameLst>
                                           <p:attrName>style.visibility</p:attrName>
@@ -39636,100 +39992,7 @@
                                           </p:stCondLst>
                                         </p:cTn>
                                         <p:tgtEl>
-                                          <p:spTgt spid="13">
-                                            <p:txEl>
-                                              <p:pRg st="0" end="0"/>
-                                            </p:txEl>
-                                          </p:spTgt>
-                                        </p:tgtEl>
-                                        <p:attrNameLst>
-                                          <p:attrName>style.visibility</p:attrName>
-                                        </p:attrNameLst>
-                                      </p:cBhvr>
-                                      <p:to>
-                                        <p:strVal val="visible"/>
-                                      </p:to>
-                                    </p:set>
-                                  </p:childTnLst>
-                                </p:cTn>
-                              </p:par>
-                              <p:par>
-                                <p:cTn id="9" presetID="1" presetClass="entr" presetSubtype="0" fill="hold" grpId="0" nodeType="withEffect">
-                                  <p:stCondLst>
-                                    <p:cond delay="0"/>
-                                  </p:stCondLst>
-                                  <p:childTnLst>
-                                    <p:set>
-                                      <p:cBhvr>
-                                        <p:cTn id="10" dur="1" fill="hold">
-                                          <p:stCondLst>
-                                            <p:cond delay="0"/>
-                                          </p:stCondLst>
-                                        </p:cTn>
-                                        <p:tgtEl>
-                                          <p:spTgt spid="13">
-                                            <p:txEl>
-                                              <p:pRg st="3" end="3"/>
-                                            </p:txEl>
-                                          </p:spTgt>
-                                        </p:tgtEl>
-                                        <p:attrNameLst>
-                                          <p:attrName>style.visibility</p:attrName>
-                                        </p:attrNameLst>
-                                      </p:cBhvr>
-                                      <p:to>
-                                        <p:strVal val="visible"/>
-                                      </p:to>
-                                    </p:set>
-                                  </p:childTnLst>
-                                </p:cTn>
-                              </p:par>
-                              <p:par>
-                                <p:cTn id="11" presetID="1" presetClass="entr" presetSubtype="0" fill="hold" grpId="0" nodeType="withEffect">
-                                  <p:stCondLst>
-                                    <p:cond delay="0"/>
-                                  </p:stCondLst>
-                                  <p:childTnLst>
-                                    <p:set>
-                                      <p:cBhvr>
-                                        <p:cTn id="12" dur="1" fill="hold">
-                                          <p:stCondLst>
-                                            <p:cond delay="0"/>
-                                          </p:stCondLst>
-                                        </p:cTn>
-                                        <p:tgtEl>
-                                          <p:spTgt spid="13">
-                                            <p:txEl>
-                                              <p:pRg st="4" end="4"/>
-                                            </p:txEl>
-                                          </p:spTgt>
-                                        </p:tgtEl>
-                                        <p:attrNameLst>
-                                          <p:attrName>style.visibility</p:attrName>
-                                        </p:attrNameLst>
-                                      </p:cBhvr>
-                                      <p:to>
-                                        <p:strVal val="visible"/>
-                                      </p:to>
-                                    </p:set>
-                                  </p:childTnLst>
-                                </p:cTn>
-                              </p:par>
-                              <p:par>
-                                <p:cTn id="13" presetID="1" presetClass="entr" presetSubtype="0" fill="hold" grpId="0" nodeType="withEffect">
-                                  <p:stCondLst>
-                                    <p:cond delay="0"/>
-                                  </p:stCondLst>
-                                  <p:childTnLst>
-                                    <p:set>
-                                      <p:cBhvr>
-                                        <p:cTn id="14" dur="1" fill="hold">
-                                          <p:stCondLst>
-                                            <p:cond delay="0"/>
-                                          </p:stCondLst>
-                                        </p:cTn>
-                                        <p:tgtEl>
-                                          <p:spTgt spid="16"/>
+                                          <p:spTgt spid="13"/>
                                         </p:tgtEl>
                                         <p:attrNameLst>
                                           <p:attrName>style.visibility</p:attrName>
@@ -39749,154 +40012,32 @@
                     </p:cTn>
                   </p:par>
                   <p:par>
-                    <p:cTn id="15" fill="hold">
+                    <p:cTn id="9" fill="hold">
                       <p:stCondLst>
                         <p:cond delay="indefinite"/>
                       </p:stCondLst>
                       <p:childTnLst>
                         <p:par>
-                          <p:cTn id="16" fill="hold">
+                          <p:cTn id="10" fill="hold">
                             <p:stCondLst>
                               <p:cond delay="0"/>
                             </p:stCondLst>
                             <p:childTnLst>
                               <p:par>
-                                <p:cTn id="17" presetID="1" presetClass="entr" presetSubtype="0" fill="hold" grpId="0" nodeType="clickEffect">
+                                <p:cTn id="11" presetID="1" presetClass="entr" presetSubtype="0" fill="hold" grpId="0" nodeType="clickEffect">
                                   <p:stCondLst>
                                     <p:cond delay="0"/>
                                   </p:stCondLst>
                                   <p:childTnLst>
                                     <p:set>
                                       <p:cBhvr>
-                                        <p:cTn id="18" dur="1" fill="hold">
+                                        <p:cTn id="12" dur="1" fill="hold">
                                           <p:stCondLst>
                                             <p:cond delay="0"/>
                                           </p:stCondLst>
                                         </p:cTn>
                                         <p:tgtEl>
-                                          <p:spTgt spid="14">
-                                            <p:bg/>
-                                          </p:spTgt>
-                                        </p:tgtEl>
-                                        <p:attrNameLst>
-                                          <p:attrName>style.visibility</p:attrName>
-                                        </p:attrNameLst>
-                                      </p:cBhvr>
-                                      <p:to>
-                                        <p:strVal val="visible"/>
-                                      </p:to>
-                                    </p:set>
-                                  </p:childTnLst>
-                                </p:cTn>
-                              </p:par>
-                              <p:par>
-                                <p:cTn id="19" presetID="1" presetClass="entr" presetSubtype="0" fill="hold" grpId="0" nodeType="withEffect">
-                                  <p:stCondLst>
-                                    <p:cond delay="0"/>
-                                  </p:stCondLst>
-                                  <p:childTnLst>
-                                    <p:set>
-                                      <p:cBhvr>
-                                        <p:cTn id="20" dur="1" fill="hold">
-                                          <p:stCondLst>
-                                            <p:cond delay="0"/>
-                                          </p:stCondLst>
-                                        </p:cTn>
-                                        <p:tgtEl>
-                                          <p:spTgt spid="14">
-                                            <p:txEl>
-                                              <p:pRg st="0" end="0"/>
-                                            </p:txEl>
-                                          </p:spTgt>
-                                        </p:tgtEl>
-                                        <p:attrNameLst>
-                                          <p:attrName>style.visibility</p:attrName>
-                                        </p:attrNameLst>
-                                      </p:cBhvr>
-                                      <p:to>
-                                        <p:strVal val="visible"/>
-                                      </p:to>
-                                    </p:set>
-                                  </p:childTnLst>
-                                </p:cTn>
-                              </p:par>
-                              <p:par>
-                                <p:cTn id="21" presetID="1" presetClass="entr" presetSubtype="0" fill="hold" grpId="0" nodeType="withEffect">
-                                  <p:stCondLst>
-                                    <p:cond delay="0"/>
-                                  </p:stCondLst>
-                                  <p:childTnLst>
-                                    <p:set>
-                                      <p:cBhvr>
-                                        <p:cTn id="22" dur="1" fill="hold">
-                                          <p:stCondLst>
-                                            <p:cond delay="0"/>
-                                          </p:stCondLst>
-                                        </p:cTn>
-                                        <p:tgtEl>
-                                          <p:spTgt spid="14">
-                                            <p:txEl>
-                                              <p:pRg st="1" end="1"/>
-                                            </p:txEl>
-                                          </p:spTgt>
-                                        </p:tgtEl>
-                                        <p:attrNameLst>
-                                          <p:attrName>style.visibility</p:attrName>
-                                        </p:attrNameLst>
-                                      </p:cBhvr>
-                                      <p:to>
-                                        <p:strVal val="visible"/>
-                                      </p:to>
-                                    </p:set>
-                                  </p:childTnLst>
-                                </p:cTn>
-                              </p:par>
-                              <p:par>
-                                <p:cTn id="23" presetID="1" presetClass="entr" presetSubtype="0" fill="hold" grpId="0" nodeType="withEffect">
-                                  <p:stCondLst>
-                                    <p:cond delay="0"/>
-                                  </p:stCondLst>
-                                  <p:childTnLst>
-                                    <p:set>
-                                      <p:cBhvr>
-                                        <p:cTn id="24" dur="1" fill="hold">
-                                          <p:stCondLst>
-                                            <p:cond delay="0"/>
-                                          </p:stCondLst>
-                                        </p:cTn>
-                                        <p:tgtEl>
-                                          <p:spTgt spid="14">
-                                            <p:txEl>
-                                              <p:pRg st="2" end="2"/>
-                                            </p:txEl>
-                                          </p:spTgt>
-                                        </p:tgtEl>
-                                        <p:attrNameLst>
-                                          <p:attrName>style.visibility</p:attrName>
-                                        </p:attrNameLst>
-                                      </p:cBhvr>
-                                      <p:to>
-                                        <p:strVal val="visible"/>
-                                      </p:to>
-                                    </p:set>
-                                  </p:childTnLst>
-                                </p:cTn>
-                              </p:par>
-                              <p:par>
-                                <p:cTn id="25" presetID="1" presetClass="entr" presetSubtype="0" fill="hold" grpId="0" nodeType="withEffect">
-                                  <p:stCondLst>
-                                    <p:cond delay="0"/>
-                                  </p:stCondLst>
-                                  <p:childTnLst>
-                                    <p:set>
-                                      <p:cBhvr>
-                                        <p:cTn id="26" dur="1" fill="hold">
-                                          <p:stCondLst>
-                                            <p:cond delay="0"/>
-                                          </p:stCondLst>
-                                        </p:cTn>
-                                        <p:tgtEl>
-                                          <p:spTgt spid="15"/>
+                                          <p:spTgt spid="52"/>
                                         </p:tgtEl>
                                         <p:attrNameLst>
                                           <p:attrName>style.visibility</p:attrName>
@@ -39916,26 +40057,170 @@
                     </p:cTn>
                   </p:par>
                   <p:par>
-                    <p:cTn id="27" fill="hold">
+                    <p:cTn id="13" fill="hold">
                       <p:stCondLst>
                         <p:cond delay="indefinite"/>
                       </p:stCondLst>
                       <p:childTnLst>
                         <p:par>
-                          <p:cTn id="28" fill="hold">
+                          <p:cTn id="14" fill="hold">
                             <p:stCondLst>
                               <p:cond delay="0"/>
                             </p:stCondLst>
                             <p:childTnLst>
                               <p:par>
-                                <p:cTn id="29" presetID="1" presetClass="entr" presetSubtype="0" fill="hold" grpId="0" nodeType="clickEffect">
+                                <p:cTn id="15" presetID="1" presetClass="entr" presetSubtype="0" fill="hold" grpId="0" nodeType="clickEffect">
                                   <p:stCondLst>
                                     <p:cond delay="0"/>
                                   </p:stCondLst>
                                   <p:childTnLst>
                                     <p:set>
                                       <p:cBhvr>
-                                        <p:cTn id="30" dur="1" fill="hold">
+                                        <p:cTn id="16" dur="1" fill="hold">
+                                          <p:stCondLst>
+                                            <p:cond delay="0"/>
+                                          </p:stCondLst>
+                                        </p:cTn>
+                                        <p:tgtEl>
+                                          <p:spTgt spid="15"/>
+                                        </p:tgtEl>
+                                        <p:attrNameLst>
+                                          <p:attrName>style.visibility</p:attrName>
+                                        </p:attrNameLst>
+                                      </p:cBhvr>
+                                      <p:to>
+                                        <p:strVal val="visible"/>
+                                      </p:to>
+                                    </p:set>
+                                  </p:childTnLst>
+                                </p:cTn>
+                              </p:par>
+                              <p:par>
+                                <p:cTn id="17" presetID="1" presetClass="entr" presetSubtype="0" fill="hold" grpId="0" nodeType="withEffect">
+                                  <p:stCondLst>
+                                    <p:cond delay="0"/>
+                                  </p:stCondLst>
+                                  <p:childTnLst>
+                                    <p:set>
+                                      <p:cBhvr>
+                                        <p:cTn id="18" dur="1" fill="hold">
+                                          <p:stCondLst>
+                                            <p:cond delay="0"/>
+                                          </p:stCondLst>
+                                        </p:cTn>
+                                        <p:tgtEl>
+                                          <p:spTgt spid="14"/>
+                                        </p:tgtEl>
+                                        <p:attrNameLst>
+                                          <p:attrName>style.visibility</p:attrName>
+                                        </p:attrNameLst>
+                                      </p:cBhvr>
+                                      <p:to>
+                                        <p:strVal val="visible"/>
+                                      </p:to>
+                                    </p:set>
+                                  </p:childTnLst>
+                                </p:cTn>
+                              </p:par>
+                            </p:childTnLst>
+                          </p:cTn>
+                        </p:par>
+                      </p:childTnLst>
+                    </p:cTn>
+                  </p:par>
+                  <p:par>
+                    <p:cTn id="19" fill="hold">
+                      <p:stCondLst>
+                        <p:cond delay="indefinite"/>
+                      </p:stCondLst>
+                      <p:childTnLst>
+                        <p:par>
+                          <p:cTn id="20" fill="hold">
+                            <p:stCondLst>
+                              <p:cond delay="0"/>
+                            </p:stCondLst>
+                            <p:childTnLst>
+                              <p:par>
+                                <p:cTn id="21" presetID="1" presetClass="entr" presetSubtype="0" fill="hold" grpId="0" nodeType="clickEffect">
+                                  <p:stCondLst>
+                                    <p:cond delay="0"/>
+                                  </p:stCondLst>
+                                  <p:childTnLst>
+                                    <p:set>
+                                      <p:cBhvr>
+                                        <p:cTn id="22" dur="1" fill="hold">
+                                          <p:stCondLst>
+                                            <p:cond delay="0"/>
+                                          </p:stCondLst>
+                                        </p:cTn>
+                                        <p:tgtEl>
+                                          <p:spTgt spid="51"/>
+                                        </p:tgtEl>
+                                        <p:attrNameLst>
+                                          <p:attrName>style.visibility</p:attrName>
+                                        </p:attrNameLst>
+                                      </p:cBhvr>
+                                      <p:to>
+                                        <p:strVal val="visible"/>
+                                      </p:to>
+                                    </p:set>
+                                  </p:childTnLst>
+                                </p:cTn>
+                              </p:par>
+                            </p:childTnLst>
+                          </p:cTn>
+                        </p:par>
+                      </p:childTnLst>
+                    </p:cTn>
+                  </p:par>
+                  <p:par>
+                    <p:cTn id="23" fill="hold">
+                      <p:stCondLst>
+                        <p:cond delay="indefinite"/>
+                      </p:stCondLst>
+                      <p:childTnLst>
+                        <p:par>
+                          <p:cTn id="24" fill="hold">
+                            <p:stCondLst>
+                              <p:cond delay="0"/>
+                            </p:stCondLst>
+                            <p:childTnLst>
+                              <p:par>
+                                <p:cTn id="25" presetID="1" presetClass="entr" presetSubtype="0" fill="hold" grpId="0" nodeType="clickEffect">
+                                  <p:stCondLst>
+                                    <p:cond delay="0"/>
+                                  </p:stCondLst>
+                                  <p:childTnLst>
+                                    <p:set>
+                                      <p:cBhvr>
+                                        <p:cTn id="26" dur="1" fill="hold">
+                                          <p:stCondLst>
+                                            <p:cond delay="0"/>
+                                          </p:stCondLst>
+                                        </p:cTn>
+                                        <p:tgtEl>
+                                          <p:spTgt spid="18"/>
+                                        </p:tgtEl>
+                                        <p:attrNameLst>
+                                          <p:attrName>style.visibility</p:attrName>
+                                        </p:attrNameLst>
+                                      </p:cBhvr>
+                                      <p:to>
+                                        <p:strVal val="visible"/>
+                                      </p:to>
+                                    </p:set>
+                                  </p:childTnLst>
+                                </p:cTn>
+                              </p:par>
+                              <p:par>
+                                <p:cTn id="27" presetID="1" presetClass="entr" presetSubtype="0" fill="hold" grpId="0" nodeType="withEffect">
+                                  <p:stCondLst>
+                                    <p:cond delay="0"/>
+                                  </p:stCondLst>
+                                  <p:childTnLst>
+                                    <p:set>
+                                      <p:cBhvr>
+                                        <p:cTn id="28" dur="1" fill="hold">
                                           <p:stCondLst>
                                             <p:cond delay="0"/>
                                           </p:stCondLst>
@@ -39954,8 +40239,26 @@
                                   </p:childTnLst>
                                 </p:cTn>
                               </p:par>
+                            </p:childTnLst>
+                          </p:cTn>
+                        </p:par>
+                      </p:childTnLst>
+                    </p:cTn>
+                  </p:par>
+                  <p:par>
+                    <p:cTn id="29" fill="hold">
+                      <p:stCondLst>
+                        <p:cond delay="indefinite"/>
+                      </p:stCondLst>
+                      <p:childTnLst>
+                        <p:par>
+                          <p:cTn id="30" fill="hold">
+                            <p:stCondLst>
+                              <p:cond delay="0"/>
+                            </p:stCondLst>
+                            <p:childTnLst>
                               <p:par>
-                                <p:cTn id="31" presetID="1" presetClass="entr" presetSubtype="0" fill="hold" grpId="0" nodeType="withEffect">
+                                <p:cTn id="31" presetID="1" presetClass="entr" presetSubtype="0" fill="hold" grpId="0" nodeType="clickEffect">
                                   <p:stCondLst>
                                     <p:cond delay="0"/>
                                   </p:stCondLst>
@@ -39968,7 +40271,7 @@
                                           </p:stCondLst>
                                         </p:cTn>
                                         <p:tgtEl>
-                                          <p:spTgt spid="18"/>
+                                          <p:spTgt spid="50"/>
                                         </p:tgtEl>
                                         <p:attrNameLst>
                                           <p:attrName>style.visibility</p:attrName>
@@ -40045,7 +40348,7 @@
                             </p:stCondLst>
                             <p:childTnLst>
                               <p:par>
-                                <p:cTn id="39" presetID="1" presetClass="entr" presetSubtype="0" fill="hold" nodeType="clickEffect">
+                                <p:cTn id="39" presetID="1" presetClass="entr" presetSubtype="0" fill="hold" grpId="0" nodeType="clickEffect">
                                   <p:stCondLst>
                                     <p:cond delay="0"/>
                                   </p:stCondLst>
@@ -40058,7 +40361,259 @@
                                           </p:stCondLst>
                                         </p:cTn>
                                         <p:tgtEl>
+                                          <p:spTgt spid="54"/>
+                                        </p:tgtEl>
+                                        <p:attrNameLst>
+                                          <p:attrName>style.visibility</p:attrName>
+                                        </p:attrNameLst>
+                                      </p:cBhvr>
+                                      <p:to>
+                                        <p:strVal val="visible"/>
+                                      </p:to>
+                                    </p:set>
+                                  </p:childTnLst>
+                                </p:cTn>
+                              </p:par>
+                            </p:childTnLst>
+                          </p:cTn>
+                        </p:par>
+                      </p:childTnLst>
+                    </p:cTn>
+                  </p:par>
+                  <p:par>
+                    <p:cTn id="41" fill="hold">
+                      <p:stCondLst>
+                        <p:cond delay="indefinite"/>
+                      </p:stCondLst>
+                      <p:childTnLst>
+                        <p:par>
+                          <p:cTn id="42" fill="hold">
+                            <p:stCondLst>
+                              <p:cond delay="0"/>
+                            </p:stCondLst>
+                            <p:childTnLst>
+                              <p:par>
+                                <p:cTn id="43" presetID="1" presetClass="entr" presetSubtype="0" fill="hold" nodeType="clickEffect">
+                                  <p:stCondLst>
+                                    <p:cond delay="0"/>
+                                  </p:stCondLst>
+                                  <p:childTnLst>
+                                    <p:set>
+                                      <p:cBhvr>
+                                        <p:cTn id="44" dur="1" fill="hold">
+                                          <p:stCondLst>
+                                            <p:cond delay="0"/>
+                                          </p:stCondLst>
+                                        </p:cTn>
+                                        <p:tgtEl>
                                           <p:spTgt spid="24"/>
+                                        </p:tgtEl>
+                                        <p:attrNameLst>
+                                          <p:attrName>style.visibility</p:attrName>
+                                        </p:attrNameLst>
+                                      </p:cBhvr>
+                                      <p:to>
+                                        <p:strVal val="visible"/>
+                                      </p:to>
+                                    </p:set>
+                                  </p:childTnLst>
+                                </p:cTn>
+                              </p:par>
+                            </p:childTnLst>
+                          </p:cTn>
+                        </p:par>
+                      </p:childTnLst>
+                    </p:cTn>
+                  </p:par>
+                  <p:par>
+                    <p:cTn id="45" fill="hold">
+                      <p:stCondLst>
+                        <p:cond delay="indefinite"/>
+                      </p:stCondLst>
+                      <p:childTnLst>
+                        <p:par>
+                          <p:cTn id="46" fill="hold">
+                            <p:stCondLst>
+                              <p:cond delay="0"/>
+                            </p:stCondLst>
+                            <p:childTnLst>
+                              <p:par>
+                                <p:cTn id="47" presetID="1" presetClass="entr" presetSubtype="0" fill="hold" grpId="0" nodeType="clickEffect">
+                                  <p:stCondLst>
+                                    <p:cond delay="0"/>
+                                  </p:stCondLst>
+                                  <p:childTnLst>
+                                    <p:set>
+                                      <p:cBhvr>
+                                        <p:cTn id="48" dur="1" fill="hold">
+                                          <p:stCondLst>
+                                            <p:cond delay="0"/>
+                                          </p:stCondLst>
+                                        </p:cTn>
+                                        <p:tgtEl>
+                                          <p:spTgt spid="55"/>
+                                        </p:tgtEl>
+                                        <p:attrNameLst>
+                                          <p:attrName>style.visibility</p:attrName>
+                                        </p:attrNameLst>
+                                      </p:cBhvr>
+                                      <p:to>
+                                        <p:strVal val="visible"/>
+                                      </p:to>
+                                    </p:set>
+                                  </p:childTnLst>
+                                </p:cTn>
+                              </p:par>
+                            </p:childTnLst>
+                          </p:cTn>
+                        </p:par>
+                      </p:childTnLst>
+                    </p:cTn>
+                  </p:par>
+                  <p:par>
+                    <p:cTn id="49" fill="hold">
+                      <p:stCondLst>
+                        <p:cond delay="indefinite"/>
+                      </p:stCondLst>
+                      <p:childTnLst>
+                        <p:par>
+                          <p:cTn id="50" fill="hold">
+                            <p:stCondLst>
+                              <p:cond delay="0"/>
+                            </p:stCondLst>
+                            <p:childTnLst>
+                              <p:par>
+                                <p:cTn id="51" presetID="1" presetClass="entr" presetSubtype="0" fill="hold" nodeType="clickEffect">
+                                  <p:stCondLst>
+                                    <p:cond delay="0"/>
+                                  </p:stCondLst>
+                                  <p:childTnLst>
+                                    <p:set>
+                                      <p:cBhvr>
+                                        <p:cTn id="52" dur="1" fill="hold">
+                                          <p:stCondLst>
+                                            <p:cond delay="0"/>
+                                          </p:stCondLst>
+                                        </p:cTn>
+                                        <p:tgtEl>
+                                          <p:spTgt spid="34"/>
+                                        </p:tgtEl>
+                                        <p:attrNameLst>
+                                          <p:attrName>style.visibility</p:attrName>
+                                        </p:attrNameLst>
+                                      </p:cBhvr>
+                                      <p:to>
+                                        <p:strVal val="visible"/>
+                                      </p:to>
+                                    </p:set>
+                                  </p:childTnLst>
+                                </p:cTn>
+                              </p:par>
+                            </p:childTnLst>
+                          </p:cTn>
+                        </p:par>
+                      </p:childTnLst>
+                    </p:cTn>
+                  </p:par>
+                  <p:par>
+                    <p:cTn id="53" fill="hold">
+                      <p:stCondLst>
+                        <p:cond delay="indefinite"/>
+                      </p:stCondLst>
+                      <p:childTnLst>
+                        <p:par>
+                          <p:cTn id="54" fill="hold">
+                            <p:stCondLst>
+                              <p:cond delay="0"/>
+                            </p:stCondLst>
+                            <p:childTnLst>
+                              <p:par>
+                                <p:cTn id="55" presetID="1" presetClass="entr" presetSubtype="0" fill="hold" grpId="0" nodeType="clickEffect">
+                                  <p:stCondLst>
+                                    <p:cond delay="0"/>
+                                  </p:stCondLst>
+                                  <p:childTnLst>
+                                    <p:set>
+                                      <p:cBhvr>
+                                        <p:cTn id="56" dur="1" fill="hold">
+                                          <p:stCondLst>
+                                            <p:cond delay="0"/>
+                                          </p:stCondLst>
+                                        </p:cTn>
+                                        <p:tgtEl>
+                                          <p:spTgt spid="57"/>
+                                        </p:tgtEl>
+                                        <p:attrNameLst>
+                                          <p:attrName>style.visibility</p:attrName>
+                                        </p:attrNameLst>
+                                      </p:cBhvr>
+                                      <p:to>
+                                        <p:strVal val="visible"/>
+                                      </p:to>
+                                    </p:set>
+                                  </p:childTnLst>
+                                </p:cTn>
+                              </p:par>
+                            </p:childTnLst>
+                          </p:cTn>
+                        </p:par>
+                      </p:childTnLst>
+                    </p:cTn>
+                  </p:par>
+                  <p:par>
+                    <p:cTn id="57" fill="hold">
+                      <p:stCondLst>
+                        <p:cond delay="indefinite"/>
+                      </p:stCondLst>
+                      <p:childTnLst>
+                        <p:par>
+                          <p:cTn id="58" fill="hold">
+                            <p:stCondLst>
+                              <p:cond delay="0"/>
+                            </p:stCondLst>
+                            <p:childTnLst>
+                              <p:par>
+                                <p:cTn id="59" presetID="1" presetClass="entr" presetSubtype="0" fill="hold" nodeType="clickEffect">
+                                  <p:stCondLst>
+                                    <p:cond delay="0"/>
+                                  </p:stCondLst>
+                                  <p:childTnLst>
+                                    <p:set>
+                                      <p:cBhvr>
+                                        <p:cTn id="60" dur="1" fill="hold">
+                                          <p:stCondLst>
+                                            <p:cond delay="0"/>
+                                          </p:stCondLst>
+                                        </p:cTn>
+                                        <p:tgtEl>
+                                          <p:spTgt spid="45"/>
+                                        </p:tgtEl>
+                                        <p:attrNameLst>
+                                          <p:attrName>style.visibility</p:attrName>
+                                        </p:attrNameLst>
+                                      </p:cBhvr>
+                                      <p:to>
+                                        <p:strVal val="visible"/>
+                                      </p:to>
+                                    </p:set>
+                                  </p:childTnLst>
+                                </p:cTn>
+                              </p:par>
+                              <p:par>
+                                <p:cTn id="61" presetID="1" presetClass="entr" presetSubtype="0" fill="hold" grpId="0" nodeType="withEffect">
+                                  <p:stCondLst>
+                                    <p:cond delay="0"/>
+                                  </p:stCondLst>
+                                  <p:childTnLst>
+                                    <p:set>
+                                      <p:cBhvr>
+                                        <p:cTn id="62" dur="1" fill="hold">
+                                          <p:stCondLst>
+                                            <p:cond delay="0"/>
+                                          </p:stCondLst>
+                                        </p:cTn>
+                                        <p:tgtEl>
+                                          <p:spTgt spid="58"/>
                                         </p:tgtEl>
                                         <p:attrNameLst>
                                           <p:attrName>style.visibility</p:attrName>
@@ -40099,12 +40654,19 @@
       </p:par>
     </p:tnLst>
     <p:bldLst>
-      <p:bldP spid="13" grpId="0" build="p" animBg="1"/>
-      <p:bldP spid="14" grpId="0" build="p" animBg="1"/>
+      <p:bldP spid="13" grpId="0" animBg="1"/>
+      <p:bldP spid="14" grpId="0" animBg="1"/>
       <p:bldP spid="15" grpId="0" animBg="1"/>
       <p:bldP spid="16" grpId="0" animBg="1"/>
       <p:bldP spid="17" grpId="0" animBg="1"/>
       <p:bldP spid="18" grpId="0" animBg="1"/>
+      <p:bldP spid="50" grpId="0"/>
+      <p:bldP spid="51" grpId="0"/>
+      <p:bldP spid="52" grpId="0"/>
+      <p:bldP spid="54" grpId="0"/>
+      <p:bldP spid="55" grpId="0"/>
+      <p:bldP spid="57" grpId="0"/>
+      <p:bldP spid="58" grpId="0"/>
     </p:bldLst>
   </p:timing>
 </p:sld>
@@ -46987,24 +47549,6 @@
 </file>
 
 <file path=customXml/item1.xml><?xml version="1.0" encoding="utf-8"?>
-<?mso-contentType ?>
-<FormTemplates xmlns="http://schemas.microsoft.com/sharepoint/v3/contenttype/forms">
-  <Display>DocumentLibraryForm</Display>
-  <Edit>DocumentLibraryForm</Edit>
-  <New>DocumentLibraryForm</New>
-</FormTemplates>
-</file>
-
-<file path=customXml/item2.xml><?xml version="1.0" encoding="utf-8"?>
-<p:properties xmlns:p="http://schemas.microsoft.com/office/2006/metadata/properties" xmlns:xsi="http://www.w3.org/2001/XMLSchema-instance" xmlns:pc="http://schemas.microsoft.com/office/infopath/2007/PartnerControls">
-  <documentManagement>
-    <_Version xmlns="http://schemas.microsoft.com/sharepoint/v3/fields" xsi:nil="true"/>
-    <_Status xmlns="http://schemas.microsoft.com/sharepoint/v3/fields">Not Started</_Status>
-  </documentManagement>
-</p:properties>
-</file>
-
-<file path=customXml/item3.xml><?xml version="1.0" encoding="utf-8"?>
 <ct:contentTypeSchema xmlns:ct="http://schemas.microsoft.com/office/2006/metadata/contentType" xmlns:ma="http://schemas.microsoft.com/office/2006/metadata/properties/metaAttributes" ct:_="" ma:_="" ma:contentTypeName="Document" ma:contentTypeID="0x0101000DE64AEEDD9B7A4D93545ACBE97D4615" ma:contentTypeVersion="2" ma:contentTypeDescription="Create a new document." ma:contentTypeScope="" ma:versionID="f49002b78e3a4a71b814eef46a983816">
   <xsd:schema xmlns:xsd="http://www.w3.org/2001/XMLSchema" xmlns:xs="http://www.w3.org/2001/XMLSchema" xmlns:p="http://schemas.microsoft.com/office/2006/metadata/properties" xmlns:ns2="http://schemas.microsoft.com/sharepoint/v3/fields" targetNamespace="http://schemas.microsoft.com/office/2006/metadata/properties" ma:root="true" ma:fieldsID="38f6db2dd0d9a0cf6a8dc37be32b365b" ns2:_="">
     <xsd:import namespace="http://schemas.microsoft.com/sharepoint/v3/fields"/>
@@ -47148,31 +47692,25 @@
 </ct:contentTypeSchema>
 </file>
 
-<file path=customXml/itemProps1.xml><?xml version="1.0" encoding="utf-8"?>
-<ds:datastoreItem xmlns:ds="http://schemas.openxmlformats.org/officeDocument/2006/customXml" ds:itemID="{87D2A1B0-FF3E-4009-940D-AED0EB70AA20}">
-  <ds:schemaRefs>
-    <ds:schemaRef ds:uri="http://schemas.microsoft.com/sharepoint/v3/contenttype/forms"/>
-  </ds:schemaRefs>
-</ds:datastoreItem>
+<file path=customXml/item2.xml><?xml version="1.0" encoding="utf-8"?>
+<?mso-contentType ?>
+<FormTemplates xmlns="http://schemas.microsoft.com/sharepoint/v3/contenttype/forms">
+  <Display>DocumentLibraryForm</Display>
+  <Edit>DocumentLibraryForm</Edit>
+  <New>DocumentLibraryForm</New>
+</FormTemplates>
 </file>
 
-<file path=customXml/itemProps2.xml><?xml version="1.0" encoding="utf-8"?>
-<ds:datastoreItem xmlns:ds="http://schemas.openxmlformats.org/officeDocument/2006/customXml" ds:itemID="{7B6F2769-7194-4217-93D3-3AF3A4742282}">
-  <ds:schemaRefs>
-    <ds:schemaRef ds:uri="http://purl.org/dc/terms/"/>
-    <ds:schemaRef ds:uri="http://schemas.openxmlformats.org/package/2006/metadata/core-properties"/>
-    <ds:schemaRef ds:uri="http://schemas.microsoft.com/office/2006/documentManagement/types"/>
-    <ds:schemaRef ds:uri="http://schemas.microsoft.com/office/infopath/2007/PartnerControls"/>
-    <ds:schemaRef ds:uri="http://purl.org/dc/elements/1.1/"/>
-    <ds:schemaRef ds:uri="http://schemas.microsoft.com/office/2006/metadata/properties"/>
-    <ds:schemaRef ds:uri="http://schemas.microsoft.com/sharepoint/v3/fields"/>
-    <ds:schemaRef ds:uri="http://www.w3.org/XML/1998/namespace"/>
-    <ds:schemaRef ds:uri="http://purl.org/dc/dcmitype/"/>
-  </ds:schemaRefs>
-</ds:datastoreItem>
+<file path=customXml/item3.xml><?xml version="1.0" encoding="utf-8"?>
+<p:properties xmlns:p="http://schemas.microsoft.com/office/2006/metadata/properties" xmlns:xsi="http://www.w3.org/2001/XMLSchema-instance" xmlns:pc="http://schemas.microsoft.com/office/infopath/2007/PartnerControls">
+  <documentManagement>
+    <_Version xmlns="http://schemas.microsoft.com/sharepoint/v3/fields" xsi:nil="true"/>
+    <_Status xmlns="http://schemas.microsoft.com/sharepoint/v3/fields">Not Started</_Status>
+  </documentManagement>
+</p:properties>
 </file>
 
-<file path=customXml/itemProps3.xml><?xml version="1.0" encoding="utf-8"?>
+<file path=customXml/itemProps1.xml><?xml version="1.0" encoding="utf-8"?>
 <ds:datastoreItem xmlns:ds="http://schemas.openxmlformats.org/officeDocument/2006/customXml" ds:itemID="{E4214858-785C-42F7-BE66-6D0E79395FC8}">
   <ds:schemaRefs>
     <ds:schemaRef ds:uri="http://schemas.microsoft.com/office/2006/metadata/contentType"/>
@@ -47188,4 +47726,28 @@
     <ds:schemaRef ds:uri="http://schemas.microsoft.com/internal/obd"/>
   </ds:schemaRefs>
 </ds:datastoreItem>
+</file>
+
+<file path=customXml/itemProps2.xml><?xml version="1.0" encoding="utf-8"?>
+<ds:datastoreItem xmlns:ds="http://schemas.openxmlformats.org/officeDocument/2006/customXml" ds:itemID="{87D2A1B0-FF3E-4009-940D-AED0EB70AA20}">
+  <ds:schemaRefs>
+    <ds:schemaRef ds:uri="http://schemas.microsoft.com/sharepoint/v3/contenttype/forms"/>
+  </ds:schemaRefs>
+</ds:datastoreItem>
+</file>
+
+<file path=customXml/itemProps3.xml><?xml version="1.0" encoding="utf-8"?>
+<ds:datastoreItem xmlns:ds="http://schemas.openxmlformats.org/officeDocument/2006/customXml" ds:itemID="{7B6F2769-7194-4217-93D3-3AF3A4742282}">
+  <ds:schemaRefs>
+    <ds:schemaRef ds:uri="http://purl.org/dc/terms/"/>
+    <ds:schemaRef ds:uri="http://schemas.openxmlformats.org/package/2006/metadata/core-properties"/>
+    <ds:schemaRef ds:uri="http://schemas.microsoft.com/office/2006/documentManagement/types"/>
+    <ds:schemaRef ds:uri="http://schemas.microsoft.com/office/infopath/2007/PartnerControls"/>
+    <ds:schemaRef ds:uri="http://purl.org/dc/elements/1.1/"/>
+    <ds:schemaRef ds:uri="http://schemas.microsoft.com/office/2006/metadata/properties"/>
+    <ds:schemaRef ds:uri="http://schemas.microsoft.com/sharepoint/v3/fields"/>
+    <ds:schemaRef ds:uri="http://www.w3.org/XML/1998/namespace"/>
+    <ds:schemaRef ds:uri="http://purl.org/dc/dcmitype/"/>
+  </ds:schemaRefs>
+</ds:datastoreItem>
 </file>
</xml_diff>